<commit_message>
Experiments with LINQ queries.
</commit_message>
<xml_diff>
--- a/Coding Exercise.pptx
+++ b/Coding Exercise.pptx
@@ -524,6 +524,67 @@
             <a:r>
               <a:rPr lang="en-IE" dirty="0"/>
               <a:t>TODO animate</a:t>
+            </a:r>
+          </a:p>
+          <a:p>
+            <a:pPr marL="0" marR="0" lvl="0" indent="0" algn="l" defTabSz="914400" rtl="0" eaLnBrk="1" fontAlgn="auto" latinLnBrk="0" hangingPunct="1">
+              <a:lnSpc>
+                <a:spcPct val="100000"/>
+              </a:lnSpc>
+              <a:spcBef>
+                <a:spcPts val="0"/>
+              </a:spcBef>
+              <a:spcAft>
+                <a:spcPts val="0"/>
+              </a:spcAft>
+              <a:buClrTx/>
+              <a:buSzTx/>
+              <a:buFontTx/>
+              <a:buNone/>
+              <a:tabLst/>
+              <a:defRPr/>
+            </a:pPr>
+            <a:r>
+              <a:rPr lang="en-IE" dirty="0"/>
+              <a:t>It makes no sense for a </a:t>
+            </a:r>
+            <a:r>
+              <a:rPr lang="en-IE" dirty="0" err="1"/>
+              <a:t>VisitEntity</a:t>
+            </a:r>
+            <a:r>
+              <a:rPr lang="en-IE" dirty="0"/>
+              <a:t> to relate to many PHRs.</a:t>
+            </a:r>
+          </a:p>
+          <a:p>
+            <a:r>
+              <a:rPr lang="en-IE" dirty="0"/>
+              <a:t>PHR should be an entity, with a date attribute, and mandatory “1” </a:t>
+            </a:r>
+            <a:r>
+              <a:rPr lang="en-IE" dirty="0" err="1"/>
+              <a:t>relationshis</a:t>
+            </a:r>
+            <a:r>
+              <a:rPr lang="en-IE" dirty="0"/>
+              <a:t> to hospital and patient.  Should </a:t>
+            </a:r>
+            <a:r>
+              <a:rPr lang="en-IE"/>
+              <a:t>be renamed </a:t>
+            </a:r>
+            <a:r>
+              <a:rPr lang="en-IE" dirty="0"/>
+              <a:t>to </a:t>
+            </a:r>
+            <a:r>
+              <a:rPr lang="en-IE" dirty="0" err="1"/>
+              <a:t>PatientHospitalVisit</a:t>
+            </a:r>
+            <a:r>
+              <a:rPr lang="en-IE" dirty="0"/>
+              <a:t>.  It’s ok to have a hospital with no visit, or a patient with no visits.</a:t>
             </a:r>
           </a:p>
         </p:txBody>
@@ -5118,6 +5179,46 @@
           </a:fontRef>
         </p:style>
       </p:cxnSp>
+      <p:sp>
+        <p:nvSpPr>
+          <p:cNvPr id="3" name="TextBox 2">
+            <a:extLst>
+              <a:ext uri="{FF2B5EF4-FFF2-40B4-BE49-F238E27FC236}">
+                <a16:creationId xmlns:a16="http://schemas.microsoft.com/office/drawing/2014/main" id="{B16392A7-DA5B-1335-742E-607CC45972D3}"/>
+              </a:ext>
+            </a:extLst>
+          </p:cNvPr>
+          <p:cNvSpPr txBox="1"/>
+          <p:nvPr/>
+        </p:nvSpPr>
+        <p:spPr>
+          <a:xfrm>
+            <a:off x="8978743" y="5426307"/>
+            <a:ext cx="406532" cy="1015663"/>
+          </a:xfrm>
+          <a:prstGeom prst="rect">
+            <a:avLst/>
+          </a:prstGeom>
+          <a:noFill/>
+        </p:spPr>
+        <p:txBody>
+          <a:bodyPr wrap="square" rtlCol="0">
+            <a:spAutoFit/>
+          </a:bodyPr>
+          <a:lstStyle/>
+          <a:p>
+            <a:pPr algn="ctr"/>
+            <a:r>
+              <a:rPr lang="en-IE" sz="6000" b="1" dirty="0">
+                <a:solidFill>
+                  <a:srgbClr val="FF0000"/>
+                </a:solidFill>
+              </a:rPr>
+              <a:t>?</a:t>
+            </a:r>
+          </a:p>
+        </p:txBody>
+      </p:sp>
     </p:spTree>
     <p:extLst>
       <p:ext uri="{BB962C8B-B14F-4D97-AF65-F5344CB8AC3E}">

</xml_diff>

<commit_message>
Starting to layout search results on the UI.
</commit_message>
<xml_diff>
--- a/Coding Exercise.pptx
+++ b/Coding Exercise.pptx
@@ -5,12 +5,13 @@
     <p:sldMasterId id="2147483648" r:id="rId1"/>
   </p:sldMasterIdLst>
   <p:notesMasterIdLst>
-    <p:notesMasterId r:id="rId5"/>
+    <p:notesMasterId r:id="rId6"/>
   </p:notesMasterIdLst>
   <p:sldIdLst>
     <p:sldId id="256" r:id="rId2"/>
     <p:sldId id="257" r:id="rId3"/>
     <p:sldId id="258" r:id="rId4"/>
+    <p:sldId id="259" r:id="rId5"/>
   </p:sldIdLst>
   <p:sldSz cx="12192000" cy="6858000"/>
   <p:notesSz cx="6858000" cy="9144000"/>
@@ -199,7 +200,7 @@
           <a:p>
             <a:fld id="{CC7FF037-7D5F-4C4E-B74B-227986D06286}" type="datetimeFigureOut">
               <a:rPr lang="en-IE" smtClean="0"/>
-              <a:t>01/02/2025</a:t>
+              <a:t>02/02/2025</a:t>
             </a:fld>
             <a:endParaRPr lang="en-IE"/>
           </a:p>
@@ -774,7 +775,7 @@
           <a:p>
             <a:fld id="{CB48A5E9-356B-44C2-968B-AFC4DF35E53C}" type="datetimeFigureOut">
               <a:rPr lang="en-IE" smtClean="0"/>
-              <a:t>01/02/2025</a:t>
+              <a:t>02/02/2025</a:t>
             </a:fld>
             <a:endParaRPr lang="en-IE"/>
           </a:p>
@@ -974,7 +975,7 @@
           <a:p>
             <a:fld id="{CB48A5E9-356B-44C2-968B-AFC4DF35E53C}" type="datetimeFigureOut">
               <a:rPr lang="en-IE" smtClean="0"/>
-              <a:t>01/02/2025</a:t>
+              <a:t>02/02/2025</a:t>
             </a:fld>
             <a:endParaRPr lang="en-IE"/>
           </a:p>
@@ -1184,7 +1185,7 @@
           <a:p>
             <a:fld id="{CB48A5E9-356B-44C2-968B-AFC4DF35E53C}" type="datetimeFigureOut">
               <a:rPr lang="en-IE" smtClean="0"/>
-              <a:t>01/02/2025</a:t>
+              <a:t>02/02/2025</a:t>
             </a:fld>
             <a:endParaRPr lang="en-IE"/>
           </a:p>
@@ -1384,7 +1385,7 @@
           <a:p>
             <a:fld id="{CB48A5E9-356B-44C2-968B-AFC4DF35E53C}" type="datetimeFigureOut">
               <a:rPr lang="en-IE" smtClean="0"/>
-              <a:t>01/02/2025</a:t>
+              <a:t>02/02/2025</a:t>
             </a:fld>
             <a:endParaRPr lang="en-IE"/>
           </a:p>
@@ -1660,7 +1661,7 @@
           <a:p>
             <a:fld id="{CB48A5E9-356B-44C2-968B-AFC4DF35E53C}" type="datetimeFigureOut">
               <a:rPr lang="en-IE" smtClean="0"/>
-              <a:t>01/02/2025</a:t>
+              <a:t>02/02/2025</a:t>
             </a:fld>
             <a:endParaRPr lang="en-IE"/>
           </a:p>
@@ -1928,7 +1929,7 @@
           <a:p>
             <a:fld id="{CB48A5E9-356B-44C2-968B-AFC4DF35E53C}" type="datetimeFigureOut">
               <a:rPr lang="en-IE" smtClean="0"/>
-              <a:t>01/02/2025</a:t>
+              <a:t>02/02/2025</a:t>
             </a:fld>
             <a:endParaRPr lang="en-IE"/>
           </a:p>
@@ -2343,7 +2344,7 @@
           <a:p>
             <a:fld id="{CB48A5E9-356B-44C2-968B-AFC4DF35E53C}" type="datetimeFigureOut">
               <a:rPr lang="en-IE" smtClean="0"/>
-              <a:t>01/02/2025</a:t>
+              <a:t>02/02/2025</a:t>
             </a:fld>
             <a:endParaRPr lang="en-IE"/>
           </a:p>
@@ -2485,7 +2486,7 @@
           <a:p>
             <a:fld id="{CB48A5E9-356B-44C2-968B-AFC4DF35E53C}" type="datetimeFigureOut">
               <a:rPr lang="en-IE" smtClean="0"/>
-              <a:t>01/02/2025</a:t>
+              <a:t>02/02/2025</a:t>
             </a:fld>
             <a:endParaRPr lang="en-IE"/>
           </a:p>
@@ -2598,7 +2599,7 @@
           <a:p>
             <a:fld id="{CB48A5E9-356B-44C2-968B-AFC4DF35E53C}" type="datetimeFigureOut">
               <a:rPr lang="en-IE" smtClean="0"/>
-              <a:t>01/02/2025</a:t>
+              <a:t>02/02/2025</a:t>
             </a:fld>
             <a:endParaRPr lang="en-IE"/>
           </a:p>
@@ -2911,7 +2912,7 @@
           <a:p>
             <a:fld id="{CB48A5E9-356B-44C2-968B-AFC4DF35E53C}" type="datetimeFigureOut">
               <a:rPr lang="en-IE" smtClean="0"/>
-              <a:t>01/02/2025</a:t>
+              <a:t>02/02/2025</a:t>
             </a:fld>
             <a:endParaRPr lang="en-IE"/>
           </a:p>
@@ -3200,7 +3201,7 @@
           <a:p>
             <a:fld id="{CB48A5E9-356B-44C2-968B-AFC4DF35E53C}" type="datetimeFigureOut">
               <a:rPr lang="en-IE" smtClean="0"/>
-              <a:t>01/02/2025</a:t>
+              <a:t>02/02/2025</a:t>
             </a:fld>
             <a:endParaRPr lang="en-IE"/>
           </a:p>
@@ -3443,7 +3444,7 @@
           <a:p>
             <a:fld id="{CB48A5E9-356B-44C2-968B-AFC4DF35E53C}" type="datetimeFigureOut">
               <a:rPr lang="en-IE" smtClean="0"/>
-              <a:t>01/02/2025</a:t>
+              <a:t>02/02/2025</a:t>
             </a:fld>
             <a:endParaRPr lang="en-IE"/>
           </a:p>
@@ -5223,6 +5224,93 @@
     <p:extLst>
       <p:ext uri="{BB962C8B-B14F-4D97-AF65-F5344CB8AC3E}">
         <p14:creationId xmlns:p14="http://schemas.microsoft.com/office/powerpoint/2010/main" val="740588212"/>
+      </p:ext>
+    </p:extLst>
+  </p:cSld>
+  <p:clrMapOvr>
+    <a:masterClrMapping/>
+  </p:clrMapOvr>
+</p:sld>
+</file>
+
+<file path=ppt/slides/slide4.xml><?xml version="1.0" encoding="utf-8"?>
+<p:sld xmlns:a="http://schemas.openxmlformats.org/drawingml/2006/main" xmlns:r="http://schemas.openxmlformats.org/officeDocument/2006/relationships" xmlns:p="http://schemas.openxmlformats.org/presentationml/2006/main">
+  <p:cSld>
+    <p:spTree>
+      <p:nvGrpSpPr>
+        <p:cNvPr id="1" name=""/>
+        <p:cNvGrpSpPr/>
+        <p:nvPr/>
+      </p:nvGrpSpPr>
+      <p:grpSpPr>
+        <a:xfrm>
+          <a:off x="0" y="0"/>
+          <a:ext cx="0" cy="0"/>
+          <a:chOff x="0" y="0"/>
+          <a:chExt cx="0" cy="0"/>
+        </a:xfrm>
+      </p:grpSpPr>
+      <p:sp>
+        <p:nvSpPr>
+          <p:cNvPr id="2" name="Title 1">
+            <a:extLst>
+              <a:ext uri="{FF2B5EF4-FFF2-40B4-BE49-F238E27FC236}">
+                <a16:creationId xmlns:a16="http://schemas.microsoft.com/office/drawing/2014/main" id="{B925A798-D053-82B6-7171-52D71156F777}"/>
+              </a:ext>
+            </a:extLst>
+          </p:cNvPr>
+          <p:cNvSpPr>
+            <a:spLocks noGrp="1"/>
+          </p:cNvSpPr>
+          <p:nvPr>
+            <p:ph type="title"/>
+          </p:nvPr>
+        </p:nvSpPr>
+        <p:spPr/>
+        <p:txBody>
+          <a:bodyPr/>
+          <a:lstStyle/>
+          <a:p>
+            <a:r>
+              <a:rPr lang="en-IE" dirty="0"/>
+              <a:t>API definitions (Swagger)</a:t>
+            </a:r>
+          </a:p>
+        </p:txBody>
+      </p:sp>
+      <p:pic>
+        <p:nvPicPr>
+          <p:cNvPr id="5" name="Content Placeholder 4">
+            <a:extLst>
+              <a:ext uri="{FF2B5EF4-FFF2-40B4-BE49-F238E27FC236}">
+                <a16:creationId xmlns:a16="http://schemas.microsoft.com/office/drawing/2014/main" id="{6A22B570-4834-4F09-2957-F25E168F9339}"/>
+              </a:ext>
+            </a:extLst>
+          </p:cNvPr>
+          <p:cNvPicPr>
+            <a:picLocks noGrp="1" noChangeAspect="1"/>
+          </p:cNvPicPr>
+          <p:nvPr>
+            <p:ph idx="1"/>
+          </p:nvPr>
+        </p:nvPicPr>
+        <p:blipFill>
+          <a:blip r:embed="rId2"/>
+          <a:stretch>
+            <a:fillRect/>
+          </a:stretch>
+        </p:blipFill>
+        <p:spPr>
+          <a:xfrm>
+            <a:off x="3148591" y="1373188"/>
+            <a:ext cx="5894818" cy="5256212"/>
+          </a:xfrm>
+        </p:spPr>
+      </p:pic>
+    </p:spTree>
+    <p:extLst>
+      <p:ext uri="{BB962C8B-B14F-4D97-AF65-F5344CB8AC3E}">
+        <p14:creationId xmlns:p14="http://schemas.microsoft.com/office/powerpoint/2010/main" val="919702668"/>
       </p:ext>
     </p:extLst>
   </p:cSld>

</xml_diff>

<commit_message>
Formatted the backend code and removed unused "using" statements.
</commit_message>
<xml_diff>
--- a/Coding Exercise.pptx
+++ b/Coding Exercise.pptx
@@ -5,13 +5,14 @@
     <p:sldMasterId id="2147483648" r:id="rId1"/>
   </p:sldMasterIdLst>
   <p:notesMasterIdLst>
-    <p:notesMasterId r:id="rId6"/>
+    <p:notesMasterId r:id="rId7"/>
   </p:notesMasterIdLst>
   <p:sldIdLst>
     <p:sldId id="256" r:id="rId2"/>
     <p:sldId id="257" r:id="rId3"/>
     <p:sldId id="258" r:id="rId4"/>
     <p:sldId id="259" r:id="rId5"/>
+    <p:sldId id="260" r:id="rId6"/>
   </p:sldIdLst>
   <p:sldSz cx="12192000" cy="6858000"/>
   <p:notesSz cx="6858000" cy="9144000"/>
@@ -5311,6 +5312,510 @@
     <p:extLst>
       <p:ext uri="{BB962C8B-B14F-4D97-AF65-F5344CB8AC3E}">
         <p14:creationId xmlns:p14="http://schemas.microsoft.com/office/powerpoint/2010/main" val="919702668"/>
+      </p:ext>
+    </p:extLst>
+  </p:cSld>
+  <p:clrMapOvr>
+    <a:masterClrMapping/>
+  </p:clrMapOvr>
+</p:sld>
+</file>
+
+<file path=ppt/slides/slide5.xml><?xml version="1.0" encoding="utf-8"?>
+<p:sld xmlns:a="http://schemas.openxmlformats.org/drawingml/2006/main" xmlns:r="http://schemas.openxmlformats.org/officeDocument/2006/relationships" xmlns:p="http://schemas.openxmlformats.org/presentationml/2006/main">
+  <p:cSld>
+    <p:spTree>
+      <p:nvGrpSpPr>
+        <p:cNvPr id="1" name=""/>
+        <p:cNvGrpSpPr/>
+        <p:nvPr/>
+      </p:nvGrpSpPr>
+      <p:grpSpPr>
+        <a:xfrm>
+          <a:off x="0" y="0"/>
+          <a:ext cx="0" cy="0"/>
+          <a:chOff x="0" y="0"/>
+          <a:chExt cx="0" cy="0"/>
+        </a:xfrm>
+      </p:grpSpPr>
+      <p:sp>
+        <p:nvSpPr>
+          <p:cNvPr id="2" name="Title 1">
+            <a:extLst>
+              <a:ext uri="{FF2B5EF4-FFF2-40B4-BE49-F238E27FC236}">
+                <a16:creationId xmlns:a16="http://schemas.microsoft.com/office/drawing/2014/main" id="{B87F919A-CFF1-51F0-564D-EAD8AE34A5B7}"/>
+              </a:ext>
+            </a:extLst>
+          </p:cNvPr>
+          <p:cNvSpPr>
+            <a:spLocks noGrp="1"/>
+          </p:cNvSpPr>
+          <p:nvPr>
+            <p:ph type="title"/>
+          </p:nvPr>
+        </p:nvSpPr>
+        <p:spPr/>
+        <p:txBody>
+          <a:bodyPr/>
+          <a:lstStyle/>
+          <a:p>
+            <a:r>
+              <a:rPr lang="en-IE" dirty="0"/>
+              <a:t>TODO tech that’s new to me, ones I know</a:t>
+            </a:r>
+          </a:p>
+        </p:txBody>
+      </p:sp>
+      <p:graphicFrame>
+        <p:nvGraphicFramePr>
+          <p:cNvPr id="4" name="Content Placeholder 3">
+            <a:extLst>
+              <a:ext uri="{FF2B5EF4-FFF2-40B4-BE49-F238E27FC236}">
+                <a16:creationId xmlns:a16="http://schemas.microsoft.com/office/drawing/2014/main" id="{E226B130-9ECC-6786-D279-11F210D8A776}"/>
+              </a:ext>
+            </a:extLst>
+          </p:cNvPr>
+          <p:cNvGraphicFramePr>
+            <a:graphicFrameLocks noGrp="1"/>
+          </p:cNvGraphicFramePr>
+          <p:nvPr>
+            <p:ph idx="1"/>
+            <p:extLst>
+              <p:ext uri="{D42A27DB-BD31-4B8C-83A1-F6EECF244321}">
+                <p14:modId xmlns:p14="http://schemas.microsoft.com/office/powerpoint/2010/main" val="2735739963"/>
+              </p:ext>
+            </p:extLst>
+          </p:nvPr>
+        </p:nvGraphicFramePr>
+        <p:xfrm>
+          <a:off x="838200" y="1825625"/>
+          <a:ext cx="10515600" cy="2225040"/>
+        </p:xfrm>
+        <a:graphic>
+          <a:graphicData uri="http://schemas.openxmlformats.org/drawingml/2006/table">
+            <a:tbl>
+              <a:tblPr firstRow="1" bandRow="1">
+                <a:tableStyleId>{5C22544A-7EE6-4342-B048-85BDC9FD1C3A}</a:tableStyleId>
+              </a:tblPr>
+              <a:tblGrid>
+                <a:gridCol w="2103120">
+                  <a:extLst>
+                    <a:ext uri="{9D8B030D-6E8A-4147-A177-3AD203B41FA5}">
+                      <a16:colId xmlns:a16="http://schemas.microsoft.com/office/drawing/2014/main" val="1888702016"/>
+                    </a:ext>
+                  </a:extLst>
+                </a:gridCol>
+                <a:gridCol w="2103120">
+                  <a:extLst>
+                    <a:ext uri="{9D8B030D-6E8A-4147-A177-3AD203B41FA5}">
+                      <a16:colId xmlns:a16="http://schemas.microsoft.com/office/drawing/2014/main" val="3952709782"/>
+                    </a:ext>
+                  </a:extLst>
+                </a:gridCol>
+                <a:gridCol w="2103120">
+                  <a:extLst>
+                    <a:ext uri="{9D8B030D-6E8A-4147-A177-3AD203B41FA5}">
+                      <a16:colId xmlns:a16="http://schemas.microsoft.com/office/drawing/2014/main" val="1043776486"/>
+                    </a:ext>
+                  </a:extLst>
+                </a:gridCol>
+                <a:gridCol w="2103120">
+                  <a:extLst>
+                    <a:ext uri="{9D8B030D-6E8A-4147-A177-3AD203B41FA5}">
+                      <a16:colId xmlns:a16="http://schemas.microsoft.com/office/drawing/2014/main" val="3300723215"/>
+                    </a:ext>
+                  </a:extLst>
+                </a:gridCol>
+                <a:gridCol w="2103120">
+                  <a:extLst>
+                    <a:ext uri="{9D8B030D-6E8A-4147-A177-3AD203B41FA5}">
+                      <a16:colId xmlns:a16="http://schemas.microsoft.com/office/drawing/2014/main" val="2353682154"/>
+                    </a:ext>
+                  </a:extLst>
+                </a:gridCol>
+              </a:tblGrid>
+              <a:tr h="370840">
+                <a:tc>
+                  <a:txBody>
+                    <a:bodyPr/>
+                    <a:lstStyle/>
+                    <a:p>
+                      <a:endParaRPr lang="en-IE" dirty="0"/>
+                    </a:p>
+                  </a:txBody>
+                  <a:tcPr/>
+                </a:tc>
+                <a:tc>
+                  <a:txBody>
+                    <a:bodyPr/>
+                    <a:lstStyle/>
+                    <a:p>
+                      <a:endParaRPr lang="en-IE"/>
+                    </a:p>
+                  </a:txBody>
+                  <a:tcPr/>
+                </a:tc>
+                <a:tc>
+                  <a:txBody>
+                    <a:bodyPr/>
+                    <a:lstStyle/>
+                    <a:p>
+                      <a:endParaRPr lang="en-IE"/>
+                    </a:p>
+                  </a:txBody>
+                  <a:tcPr/>
+                </a:tc>
+                <a:tc>
+                  <a:txBody>
+                    <a:bodyPr/>
+                    <a:lstStyle/>
+                    <a:p>
+                      <a:endParaRPr lang="en-IE"/>
+                    </a:p>
+                  </a:txBody>
+                  <a:tcPr/>
+                </a:tc>
+                <a:tc>
+                  <a:txBody>
+                    <a:bodyPr/>
+                    <a:lstStyle/>
+                    <a:p>
+                      <a:endParaRPr lang="en-IE"/>
+                    </a:p>
+                  </a:txBody>
+                  <a:tcPr/>
+                </a:tc>
+                <a:extLst>
+                  <a:ext uri="{0D108BD9-81ED-4DB2-BD59-A6C34878D82A}">
+                    <a16:rowId xmlns:a16="http://schemas.microsoft.com/office/drawing/2014/main" val="3818679618"/>
+                  </a:ext>
+                </a:extLst>
+              </a:tr>
+              <a:tr h="370840">
+                <a:tc>
+                  <a:txBody>
+                    <a:bodyPr/>
+                    <a:lstStyle/>
+                    <a:p>
+                      <a:r>
+                        <a:rPr lang="en-IE" dirty="0"/>
+                        <a:t>C#</a:t>
+                      </a:r>
+                    </a:p>
+                  </a:txBody>
+                  <a:tcPr/>
+                </a:tc>
+                <a:tc>
+                  <a:txBody>
+                    <a:bodyPr/>
+                    <a:lstStyle/>
+                    <a:p>
+                      <a:r>
+                        <a:rPr lang="en-IE" dirty="0"/>
+                        <a:t>Java</a:t>
+                      </a:r>
+                    </a:p>
+                  </a:txBody>
+                  <a:tcPr/>
+                </a:tc>
+                <a:tc>
+                  <a:txBody>
+                    <a:bodyPr/>
+                    <a:lstStyle/>
+                    <a:p>
+                      <a:endParaRPr lang="en-IE" dirty="0"/>
+                    </a:p>
+                  </a:txBody>
+                  <a:tcPr/>
+                </a:tc>
+                <a:tc>
+                  <a:txBody>
+                    <a:bodyPr/>
+                    <a:lstStyle/>
+                    <a:p>
+                      <a:endParaRPr lang="en-IE" dirty="0"/>
+                    </a:p>
+                  </a:txBody>
+                  <a:tcPr/>
+                </a:tc>
+                <a:tc>
+                  <a:txBody>
+                    <a:bodyPr/>
+                    <a:lstStyle/>
+                    <a:p>
+                      <a:endParaRPr lang="en-IE" dirty="0"/>
+                    </a:p>
+                  </a:txBody>
+                  <a:tcPr/>
+                </a:tc>
+                <a:extLst>
+                  <a:ext uri="{0D108BD9-81ED-4DB2-BD59-A6C34878D82A}">
+                    <a16:rowId xmlns:a16="http://schemas.microsoft.com/office/drawing/2014/main" val="3974587250"/>
+                  </a:ext>
+                </a:extLst>
+              </a:tr>
+              <a:tr h="370840">
+                <a:tc>
+                  <a:txBody>
+                    <a:bodyPr/>
+                    <a:lstStyle/>
+                    <a:p>
+                      <a:r>
+                        <a:rPr lang="en-IE" dirty="0"/>
+                        <a:t>LINQ</a:t>
+                      </a:r>
+                    </a:p>
+                  </a:txBody>
+                  <a:tcPr/>
+                </a:tc>
+                <a:tc>
+                  <a:txBody>
+                    <a:bodyPr/>
+                    <a:lstStyle/>
+                    <a:p>
+                      <a:r>
+                        <a:rPr lang="en-IE" dirty="0"/>
+                        <a:t>Hibernate</a:t>
+                      </a:r>
+                    </a:p>
+                  </a:txBody>
+                  <a:tcPr/>
+                </a:tc>
+                <a:tc>
+                  <a:txBody>
+                    <a:bodyPr/>
+                    <a:lstStyle/>
+                    <a:p>
+                      <a:endParaRPr lang="en-IE" dirty="0"/>
+                    </a:p>
+                  </a:txBody>
+                  <a:tcPr/>
+                </a:tc>
+                <a:tc>
+                  <a:txBody>
+                    <a:bodyPr/>
+                    <a:lstStyle/>
+                    <a:p>
+                      <a:endParaRPr lang="en-IE" dirty="0"/>
+                    </a:p>
+                  </a:txBody>
+                  <a:tcPr/>
+                </a:tc>
+                <a:tc>
+                  <a:txBody>
+                    <a:bodyPr/>
+                    <a:lstStyle/>
+                    <a:p>
+                      <a:endParaRPr lang="en-IE" dirty="0"/>
+                    </a:p>
+                  </a:txBody>
+                  <a:tcPr/>
+                </a:tc>
+                <a:extLst>
+                  <a:ext uri="{0D108BD9-81ED-4DB2-BD59-A6C34878D82A}">
+                    <a16:rowId xmlns:a16="http://schemas.microsoft.com/office/drawing/2014/main" val="1122585281"/>
+                  </a:ext>
+                </a:extLst>
+              </a:tr>
+              <a:tr h="370840">
+                <a:tc>
+                  <a:txBody>
+                    <a:bodyPr/>
+                    <a:lstStyle/>
+                    <a:p>
+                      <a:r>
+                        <a:rPr lang="en-IE" dirty="0"/>
+                        <a:t>Visual Studio</a:t>
+                      </a:r>
+                    </a:p>
+                  </a:txBody>
+                  <a:tcPr/>
+                </a:tc>
+                <a:tc>
+                  <a:txBody>
+                    <a:bodyPr/>
+                    <a:lstStyle/>
+                    <a:p>
+                      <a:r>
+                        <a:rPr lang="en-IE" dirty="0"/>
+                        <a:t>Eclipse</a:t>
+                      </a:r>
+                    </a:p>
+                  </a:txBody>
+                  <a:tcPr/>
+                </a:tc>
+                <a:tc>
+                  <a:txBody>
+                    <a:bodyPr/>
+                    <a:lstStyle/>
+                    <a:p>
+                      <a:endParaRPr lang="en-IE" dirty="0"/>
+                    </a:p>
+                  </a:txBody>
+                  <a:tcPr/>
+                </a:tc>
+                <a:tc>
+                  <a:txBody>
+                    <a:bodyPr/>
+                    <a:lstStyle/>
+                    <a:p>
+                      <a:endParaRPr lang="en-IE" dirty="0"/>
+                    </a:p>
+                  </a:txBody>
+                  <a:tcPr/>
+                </a:tc>
+                <a:tc>
+                  <a:txBody>
+                    <a:bodyPr/>
+                    <a:lstStyle/>
+                    <a:p>
+                      <a:endParaRPr lang="en-IE" dirty="0"/>
+                    </a:p>
+                  </a:txBody>
+                  <a:tcPr/>
+                </a:tc>
+                <a:extLst>
+                  <a:ext uri="{0D108BD9-81ED-4DB2-BD59-A6C34878D82A}">
+                    <a16:rowId xmlns:a16="http://schemas.microsoft.com/office/drawing/2014/main" val="3171447868"/>
+                  </a:ext>
+                </a:extLst>
+              </a:tr>
+              <a:tr h="370840">
+                <a:tc>
+                  <a:txBody>
+                    <a:bodyPr/>
+                    <a:lstStyle/>
+                    <a:p>
+                      <a:r>
+                        <a:rPr lang="en-IE" dirty="0"/>
+                        <a:t>REACT</a:t>
+                      </a:r>
+                    </a:p>
+                  </a:txBody>
+                  <a:tcPr/>
+                </a:tc>
+                <a:tc>
+                  <a:txBody>
+                    <a:bodyPr/>
+                    <a:lstStyle/>
+                    <a:p>
+                      <a:r>
+                        <a:rPr lang="en-IE" dirty="0"/>
+                        <a:t>JSPs</a:t>
+                      </a:r>
+                    </a:p>
+                  </a:txBody>
+                  <a:tcPr/>
+                </a:tc>
+                <a:tc>
+                  <a:txBody>
+                    <a:bodyPr/>
+                    <a:lstStyle/>
+                    <a:p>
+                      <a:endParaRPr lang="en-IE" dirty="0"/>
+                    </a:p>
+                  </a:txBody>
+                  <a:tcPr/>
+                </a:tc>
+                <a:tc>
+                  <a:txBody>
+                    <a:bodyPr/>
+                    <a:lstStyle/>
+                    <a:p>
+                      <a:endParaRPr lang="en-IE" dirty="0"/>
+                    </a:p>
+                  </a:txBody>
+                  <a:tcPr/>
+                </a:tc>
+                <a:tc>
+                  <a:txBody>
+                    <a:bodyPr/>
+                    <a:lstStyle/>
+                    <a:p>
+                      <a:endParaRPr lang="en-IE" dirty="0"/>
+                    </a:p>
+                  </a:txBody>
+                  <a:tcPr/>
+                </a:tc>
+                <a:extLst>
+                  <a:ext uri="{0D108BD9-81ED-4DB2-BD59-A6C34878D82A}">
+                    <a16:rowId xmlns:a16="http://schemas.microsoft.com/office/drawing/2014/main" val="2153664491"/>
+                  </a:ext>
+                </a:extLst>
+              </a:tr>
+              <a:tr h="370840">
+                <a:tc>
+                  <a:txBody>
+                    <a:bodyPr/>
+                    <a:lstStyle/>
+                    <a:p>
+                      <a:r>
+                        <a:rPr lang="en-IE" dirty="0"/>
+                        <a:t>TODO </a:t>
+                      </a:r>
+                      <a:r>
+                        <a:rPr lang="en-IE"/>
+                        <a:t>any else?</a:t>
+                      </a:r>
+                      <a:endParaRPr lang="en-IE" dirty="0"/>
+                    </a:p>
+                  </a:txBody>
+                  <a:tcPr/>
+                </a:tc>
+                <a:tc>
+                  <a:txBody>
+                    <a:bodyPr/>
+                    <a:lstStyle/>
+                    <a:p>
+                      <a:endParaRPr lang="en-IE" dirty="0"/>
+                    </a:p>
+                  </a:txBody>
+                  <a:tcPr/>
+                </a:tc>
+                <a:tc>
+                  <a:txBody>
+                    <a:bodyPr/>
+                    <a:lstStyle/>
+                    <a:p>
+                      <a:endParaRPr lang="en-IE" dirty="0"/>
+                    </a:p>
+                  </a:txBody>
+                  <a:tcPr/>
+                </a:tc>
+                <a:tc>
+                  <a:txBody>
+                    <a:bodyPr/>
+                    <a:lstStyle/>
+                    <a:p>
+                      <a:endParaRPr lang="en-IE" dirty="0"/>
+                    </a:p>
+                  </a:txBody>
+                  <a:tcPr/>
+                </a:tc>
+                <a:tc>
+                  <a:txBody>
+                    <a:bodyPr/>
+                    <a:lstStyle/>
+                    <a:p>
+                      <a:endParaRPr lang="en-IE" dirty="0"/>
+                    </a:p>
+                  </a:txBody>
+                  <a:tcPr/>
+                </a:tc>
+                <a:extLst>
+                  <a:ext uri="{0D108BD9-81ED-4DB2-BD59-A6C34878D82A}">
+                    <a16:rowId xmlns:a16="http://schemas.microsoft.com/office/drawing/2014/main" val="2605663266"/>
+                  </a:ext>
+                </a:extLst>
+              </a:tr>
+            </a:tbl>
+          </a:graphicData>
+        </a:graphic>
+      </p:graphicFrame>
+    </p:spTree>
+    <p:extLst>
+      <p:ext uri="{BB962C8B-B14F-4D97-AF65-F5344CB8AC3E}">
+        <p14:creationId xmlns:p14="http://schemas.microsoft.com/office/powerpoint/2010/main" val="1913064628"/>
       </p:ext>
     </p:extLst>
   </p:cSld>

</xml_diff>

<commit_message>
Initial work to create a REACT unit test.
</commit_message>
<xml_diff>
--- a/Coding Exercise.pptx
+++ b/Coding Exercise.pptx
@@ -202,7 +202,7 @@
           <a:p>
             <a:fld id="{CC7FF037-7D5F-4C4E-B74B-227986D06286}" type="datetimeFigureOut">
               <a:rPr lang="en-IE" smtClean="0"/>
-              <a:t>02/02/2025</a:t>
+              <a:t>03/02/2025</a:t>
             </a:fld>
             <a:endParaRPr lang="en-IE"/>
           </a:p>
@@ -975,7 +975,7 @@
           <a:p>
             <a:fld id="{CB48A5E9-356B-44C2-968B-AFC4DF35E53C}" type="datetimeFigureOut">
               <a:rPr lang="en-IE" smtClean="0"/>
-              <a:t>02/02/2025</a:t>
+              <a:t>03/02/2025</a:t>
             </a:fld>
             <a:endParaRPr lang="en-IE"/>
           </a:p>
@@ -1175,7 +1175,7 @@
           <a:p>
             <a:fld id="{CB48A5E9-356B-44C2-968B-AFC4DF35E53C}" type="datetimeFigureOut">
               <a:rPr lang="en-IE" smtClean="0"/>
-              <a:t>02/02/2025</a:t>
+              <a:t>03/02/2025</a:t>
             </a:fld>
             <a:endParaRPr lang="en-IE"/>
           </a:p>
@@ -1385,7 +1385,7 @@
           <a:p>
             <a:fld id="{CB48A5E9-356B-44C2-968B-AFC4DF35E53C}" type="datetimeFigureOut">
               <a:rPr lang="en-IE" smtClean="0"/>
-              <a:t>02/02/2025</a:t>
+              <a:t>03/02/2025</a:t>
             </a:fld>
             <a:endParaRPr lang="en-IE"/>
           </a:p>
@@ -1585,7 +1585,7 @@
           <a:p>
             <a:fld id="{CB48A5E9-356B-44C2-968B-AFC4DF35E53C}" type="datetimeFigureOut">
               <a:rPr lang="en-IE" smtClean="0"/>
-              <a:t>02/02/2025</a:t>
+              <a:t>03/02/2025</a:t>
             </a:fld>
             <a:endParaRPr lang="en-IE"/>
           </a:p>
@@ -1861,7 +1861,7 @@
           <a:p>
             <a:fld id="{CB48A5E9-356B-44C2-968B-AFC4DF35E53C}" type="datetimeFigureOut">
               <a:rPr lang="en-IE" smtClean="0"/>
-              <a:t>02/02/2025</a:t>
+              <a:t>03/02/2025</a:t>
             </a:fld>
             <a:endParaRPr lang="en-IE"/>
           </a:p>
@@ -2129,7 +2129,7 @@
           <a:p>
             <a:fld id="{CB48A5E9-356B-44C2-968B-AFC4DF35E53C}" type="datetimeFigureOut">
               <a:rPr lang="en-IE" smtClean="0"/>
-              <a:t>02/02/2025</a:t>
+              <a:t>03/02/2025</a:t>
             </a:fld>
             <a:endParaRPr lang="en-IE"/>
           </a:p>
@@ -2544,7 +2544,7 @@
           <a:p>
             <a:fld id="{CB48A5E9-356B-44C2-968B-AFC4DF35E53C}" type="datetimeFigureOut">
               <a:rPr lang="en-IE" smtClean="0"/>
-              <a:t>02/02/2025</a:t>
+              <a:t>03/02/2025</a:t>
             </a:fld>
             <a:endParaRPr lang="en-IE"/>
           </a:p>
@@ -2686,7 +2686,7 @@
           <a:p>
             <a:fld id="{CB48A5E9-356B-44C2-968B-AFC4DF35E53C}" type="datetimeFigureOut">
               <a:rPr lang="en-IE" smtClean="0"/>
-              <a:t>02/02/2025</a:t>
+              <a:t>03/02/2025</a:t>
             </a:fld>
             <a:endParaRPr lang="en-IE"/>
           </a:p>
@@ -2799,7 +2799,7 @@
           <a:p>
             <a:fld id="{CB48A5E9-356B-44C2-968B-AFC4DF35E53C}" type="datetimeFigureOut">
               <a:rPr lang="en-IE" smtClean="0"/>
-              <a:t>02/02/2025</a:t>
+              <a:t>03/02/2025</a:t>
             </a:fld>
             <a:endParaRPr lang="en-IE"/>
           </a:p>
@@ -3112,7 +3112,7 @@
           <a:p>
             <a:fld id="{CB48A5E9-356B-44C2-968B-AFC4DF35E53C}" type="datetimeFigureOut">
               <a:rPr lang="en-IE" smtClean="0"/>
-              <a:t>02/02/2025</a:t>
+              <a:t>03/02/2025</a:t>
             </a:fld>
             <a:endParaRPr lang="en-IE"/>
           </a:p>
@@ -3401,7 +3401,7 @@
           <a:p>
             <a:fld id="{CB48A5E9-356B-44C2-968B-AFC4DF35E53C}" type="datetimeFigureOut">
               <a:rPr lang="en-IE" smtClean="0"/>
-              <a:t>02/02/2025</a:t>
+              <a:t>03/02/2025</a:t>
             </a:fld>
             <a:endParaRPr lang="en-IE"/>
           </a:p>
@@ -3644,7 +3644,7 @@
           <a:p>
             <a:fld id="{CB48A5E9-356B-44C2-968B-AFC4DF35E53C}" type="datetimeFigureOut">
               <a:rPr lang="en-IE" smtClean="0"/>
-              <a:t>02/02/2025</a:t>
+              <a:t>03/02/2025</a:t>
             </a:fld>
             <a:endParaRPr lang="en-IE"/>
           </a:p>
@@ -6277,14 +6277,14 @@
             <p:ph idx="1"/>
             <p:extLst>
               <p:ext uri="{D42A27DB-BD31-4B8C-83A1-F6EECF244321}">
-                <p14:modId xmlns:p14="http://schemas.microsoft.com/office/powerpoint/2010/main" val="3222476533"/>
+                <p14:modId xmlns:p14="http://schemas.microsoft.com/office/powerpoint/2010/main" val="2887519563"/>
               </p:ext>
             </p:extLst>
           </p:nvPr>
         </p:nvGraphicFramePr>
         <p:xfrm>
           <a:off x="3091992" y="2181860"/>
-          <a:ext cx="5107128" cy="2225040"/>
+          <a:ext cx="5107128" cy="2595880"/>
         </p:xfrm>
         <a:graphic>
           <a:graphicData uri="http://schemas.openxmlformats.org/drawingml/2006/table">
@@ -6386,7 +6386,10 @@
                         <a:rPr lang="en-IE" dirty="0" err="1"/>
                         <a:t>NUnit</a:t>
                       </a:r>
-                      <a:endParaRPr lang="en-IE" dirty="0"/>
+                      <a:r>
+                        <a:rPr lang="en-IE" dirty="0"/>
+                        <a:t>, Jest</a:t>
+                      </a:r>
                     </a:p>
                   </a:txBody>
                   <a:tcPr/>
@@ -6518,6 +6521,44 @@
                 <a:extLst>
                   <a:ext uri="{0D108BD9-81ED-4DB2-BD59-A6C34878D82A}">
                     <a16:rowId xmlns:a16="http://schemas.microsoft.com/office/drawing/2014/main" val="2153664491"/>
+                  </a:ext>
+                </a:extLst>
+              </a:tr>
+              <a:tr h="370840">
+                <a:tc>
+                  <a:txBody>
+                    <a:bodyPr/>
+                    <a:lstStyle/>
+                    <a:p>
+                      <a:r>
+                        <a:rPr lang="en-IE" dirty="0"/>
+                        <a:t>TypeScript</a:t>
+                      </a:r>
+                    </a:p>
+                  </a:txBody>
+                  <a:tcPr/>
+                </a:tc>
+                <a:tc>
+                  <a:txBody>
+                    <a:bodyPr/>
+                    <a:lstStyle/>
+                    <a:p>
+                      <a:r>
+                        <a:rPr lang="en-IE" dirty="0"/>
+                        <a:t>JavaScript (</a:t>
+                      </a:r>
+                      <a:r>
+                        <a:rPr lang="en-IE"/>
+                        <a:t>Node.js)</a:t>
+                      </a:r>
+                      <a:endParaRPr lang="en-IE" dirty="0"/>
+                    </a:p>
+                  </a:txBody>
+                  <a:tcPr/>
+                </a:tc>
+                <a:extLst>
+                  <a:ext uri="{0D108BD9-81ED-4DB2-BD59-A6C34878D82A}">
+                    <a16:rowId xmlns:a16="http://schemas.microsoft.com/office/drawing/2014/main" val="501923895"/>
                   </a:ext>
                 </a:extLst>
               </a:tr>

</xml_diff>

<commit_message>
Completed first draft of documentation.
</commit_message>
<xml_diff>
--- a/Coding Exercise.pptx
+++ b/Coding Exercise.pptx
@@ -477,6 +477,90 @@
   <p:cSld>
     <p:spTree>
       <p:nvGrpSpPr>
+        <p:cNvPr id="1" name=""/>
+        <p:cNvGrpSpPr/>
+        <p:nvPr/>
+      </p:nvGrpSpPr>
+      <p:grpSpPr>
+        <a:xfrm>
+          <a:off x="0" y="0"/>
+          <a:ext cx="0" cy="0"/>
+          <a:chOff x="0" y="0"/>
+          <a:chExt cx="0" cy="0"/>
+        </a:xfrm>
+      </p:grpSpPr>
+      <p:sp>
+        <p:nvSpPr>
+          <p:cNvPr id="2" name="Slide Image Placeholder 1"/>
+          <p:cNvSpPr>
+            <a:spLocks noGrp="1" noRot="1" noChangeAspect="1"/>
+          </p:cNvSpPr>
+          <p:nvPr>
+            <p:ph type="sldImg"/>
+          </p:nvPr>
+        </p:nvSpPr>
+        <p:spPr/>
+      </p:sp>
+      <p:sp>
+        <p:nvSpPr>
+          <p:cNvPr id="3" name="Notes Placeholder 2"/>
+          <p:cNvSpPr>
+            <a:spLocks noGrp="1"/>
+          </p:cNvSpPr>
+          <p:nvPr>
+            <p:ph type="body" idx="1"/>
+          </p:nvPr>
+        </p:nvSpPr>
+        <p:spPr/>
+        <p:txBody>
+          <a:bodyPr/>
+          <a:lstStyle/>
+          <a:p>
+            <a:endParaRPr lang="en-IE" dirty="0"/>
+          </a:p>
+        </p:txBody>
+      </p:sp>
+      <p:sp>
+        <p:nvSpPr>
+          <p:cNvPr id="4" name="Slide Number Placeholder 3"/>
+          <p:cNvSpPr>
+            <a:spLocks noGrp="1"/>
+          </p:cNvSpPr>
+          <p:nvPr>
+            <p:ph type="sldNum" sz="quarter" idx="5"/>
+          </p:nvPr>
+        </p:nvSpPr>
+        <p:spPr/>
+        <p:txBody>
+          <a:bodyPr/>
+          <a:lstStyle/>
+          <a:p>
+            <a:fld id="{91160FB6-B801-4C33-8BF1-6E3D8603CA77}" type="slidenum">
+              <a:rPr lang="en-IE" smtClean="0"/>
+              <a:t>2</a:t>
+            </a:fld>
+            <a:endParaRPr lang="en-IE"/>
+          </a:p>
+        </p:txBody>
+      </p:sp>
+    </p:spTree>
+    <p:extLst>
+      <p:ext uri="{BB962C8B-B14F-4D97-AF65-F5344CB8AC3E}">
+        <p14:creationId xmlns:p14="http://schemas.microsoft.com/office/powerpoint/2010/main" val="785326537"/>
+      </p:ext>
+    </p:extLst>
+  </p:cSld>
+  <p:clrMapOvr>
+    <a:masterClrMapping/>
+  </p:clrMapOvr>
+</p:notes>
+</file>
+
+<file path=ppt/notesSlides/notesSlide2.xml><?xml version="1.0" encoding="utf-8"?>
+<p:notes xmlns:a="http://schemas.openxmlformats.org/drawingml/2006/main" xmlns:r="http://schemas.openxmlformats.org/officeDocument/2006/relationships" xmlns:p="http://schemas.openxmlformats.org/presentationml/2006/main">
+  <p:cSld>
+    <p:spTree>
+      <p:nvGrpSpPr>
         <p:cNvPr id="1" name="">
           <a:extLst>
             <a:ext uri="{FF2B5EF4-FFF2-40B4-BE49-F238E27FC236}">
@@ -683,7 +767,7 @@
 </p:notes>
 </file>
 
-<file path=ppt/notesSlides/notesSlide2.xml><?xml version="1.0" encoding="utf-8"?>
+<file path=ppt/notesSlides/notesSlide3.xml><?xml version="1.0" encoding="utf-8"?>
 <p:notes xmlns:a="http://schemas.openxmlformats.org/drawingml/2006/main" xmlns:r="http://schemas.openxmlformats.org/officeDocument/2006/relationships" xmlns:p="http://schemas.openxmlformats.org/presentationml/2006/main">
   <p:cSld>
     <p:spTree>
@@ -727,81 +811,7 @@
           <a:bodyPr/>
           <a:lstStyle/>
           <a:p>
-            <a:r>
-              <a:rPr lang="en-IE" dirty="0" err="1"/>
-              <a:t>PatientHospitalRelation</a:t>
-            </a:r>
-            <a:r>
-              <a:rPr lang="en-IE" dirty="0"/>
-              <a:t> doesn’t extend Entity&lt;Guid&gt;</a:t>
-            </a:r>
-          </a:p>
-          <a:p>
-            <a:r>
-              <a:rPr lang="en-IE" dirty="0"/>
-              <a:t>TODO animate</a:t>
-            </a:r>
-          </a:p>
-          <a:p>
-            <a:pPr marL="0" marR="0" lvl="0" indent="0" algn="l" defTabSz="914400" rtl="0" eaLnBrk="1" fontAlgn="auto" latinLnBrk="0" hangingPunct="1">
-              <a:lnSpc>
-                <a:spcPct val="100000"/>
-              </a:lnSpc>
-              <a:spcBef>
-                <a:spcPts val="0"/>
-              </a:spcBef>
-              <a:spcAft>
-                <a:spcPts val="0"/>
-              </a:spcAft>
-              <a:buClrTx/>
-              <a:buSzTx/>
-              <a:buFontTx/>
-              <a:buNone/>
-              <a:tabLst/>
-              <a:defRPr/>
-            </a:pPr>
-            <a:r>
-              <a:rPr lang="en-IE" dirty="0"/>
-              <a:t>It makes no sense for a </a:t>
-            </a:r>
-            <a:r>
-              <a:rPr lang="en-IE" dirty="0" err="1"/>
-              <a:t>VisitEntity</a:t>
-            </a:r>
-            <a:r>
-              <a:rPr lang="en-IE" dirty="0"/>
-              <a:t> to relate to many PHRs.</a:t>
-            </a:r>
-          </a:p>
-          <a:p>
-            <a:r>
-              <a:rPr lang="en-IE" dirty="0"/>
-              <a:t>PHR should be an entity, with a date attribute, and mandatory “1” </a:t>
-            </a:r>
-            <a:r>
-              <a:rPr lang="en-IE" dirty="0" err="1"/>
-              <a:t>relationshis</a:t>
-            </a:r>
-            <a:r>
-              <a:rPr lang="en-IE" dirty="0"/>
-              <a:t> to hospital and patient.  Should </a:t>
-            </a:r>
-            <a:r>
-              <a:rPr lang="en-IE"/>
-              <a:t>be renamed </a:t>
-            </a:r>
-            <a:r>
-              <a:rPr lang="en-IE" dirty="0"/>
-              <a:t>to </a:t>
-            </a:r>
-            <a:r>
-              <a:rPr lang="en-IE" dirty="0" err="1"/>
-              <a:t>PatientHospitalVisit</a:t>
-            </a:r>
-            <a:r>
-              <a:rPr lang="en-IE" dirty="0"/>
-              <a:t>.  It’s ok to have a hospital with no visit, or a patient with no visits.</a:t>
-            </a:r>
+            <a:endParaRPr lang="en-IE" dirty="0"/>
           </a:p>
         </p:txBody>
       </p:sp>
@@ -841,7 +851,7 @@
 </p:notes>
 </file>
 
-<file path=ppt/notesSlides/notesSlide3.xml><?xml version="1.0" encoding="utf-8"?>
+<file path=ppt/notesSlides/notesSlide4.xml><?xml version="1.0" encoding="utf-8"?>
 <p:notes xmlns:a="http://schemas.openxmlformats.org/drawingml/2006/main" xmlns:r="http://schemas.openxmlformats.org/officeDocument/2006/relationships" xmlns:p="http://schemas.openxmlformats.org/presentationml/2006/main">
   <p:cSld>
     <p:spTree>
@@ -4850,7 +4860,7 @@
           <a:p>
             <a:r>
               <a:rPr lang="en-IE" dirty="0"/>
-              <a:t>TODO structure, animate</a:t>
+              <a:t>Structure</a:t>
             </a:r>
           </a:p>
         </p:txBody>
@@ -4876,7 +4886,34 @@
           <a:bodyPr/>
           <a:lstStyle/>
           <a:p>
-            <a:endParaRPr lang="en-IE"/>
+            <a:r>
+              <a:rPr lang="en-IE" dirty="0"/>
+              <a:t>Demo</a:t>
+            </a:r>
+          </a:p>
+          <a:p>
+            <a:r>
+              <a:rPr lang="en-IE" dirty="0"/>
+              <a:t>Entity Relationship Diagram</a:t>
+            </a:r>
+          </a:p>
+          <a:p>
+            <a:r>
+              <a:rPr lang="en-IE" dirty="0"/>
+              <a:t>API definitions (Swagger)</a:t>
+            </a:r>
+          </a:p>
+          <a:p>
+            <a:r>
+              <a:rPr lang="en-IE" dirty="0"/>
+              <a:t>Skills</a:t>
+            </a:r>
+          </a:p>
+          <a:p>
+            <a:r>
+              <a:rPr lang="en-IE" dirty="0"/>
+              <a:t>One more week…</a:t>
+            </a:r>
           </a:p>
         </p:txBody>
       </p:sp>

</xml_diff>